<commit_message>
Update build batch files.
</commit_message>
<xml_diff>
--- a/Docs/TDL.pptx
+++ b/Docs/TDL.pptx
@@ -160,7 +160,7 @@
           </a:lstStyle>
           <a:p>
             <a:r>
-              <a:rPr lang="en-US" smtClean="0"/>
+              <a:rPr lang="en-US"/>
               <a:t>Click to edit Master title style</a:t>
             </a:r>
             <a:endParaRPr lang="en-US" dirty="0"/>
@@ -280,7 +280,7 @@
           </a:lstStyle>
           <a:p>
             <a:r>
-              <a:rPr lang="en-US" smtClean="0"/>
+              <a:rPr lang="en-US"/>
               <a:t>Click to edit Master subtitle style</a:t>
             </a:r>
             <a:endParaRPr lang="en-US" dirty="0"/>
@@ -304,7 +304,7 @@
           <a:p>
             <a:fld id="{4AAD347D-5ACD-4C99-B74B-A9C85AD731AF}" type="datetimeFigureOut">
               <a:rPr lang="en-US" dirty="0"/>
-              <a:t>4/23/2019</a:t>
+              <a:t>2/25/2020</a:t>
             </a:fld>
             <a:endParaRPr lang="en-US" dirty="0"/>
           </a:p>
@@ -404,7 +404,7 @@
           </a:lstStyle>
           <a:p>
             <a:r>
-              <a:rPr lang="en-US" smtClean="0"/>
+              <a:rPr lang="en-US"/>
               <a:t>Click to edit Master title style</a:t>
             </a:r>
             <a:endParaRPr lang="en-US" dirty="0"/>
@@ -483,7 +483,7 @@
           </a:lstStyle>
           <a:p>
             <a:r>
-              <a:rPr lang="en-US" smtClean="0"/>
+              <a:rPr lang="en-US"/>
               <a:t>Click icon to add picture</a:t>
             </a:r>
             <a:endParaRPr lang="en-US" dirty="0"/>
@@ -551,7 +551,7 @@
           <a:p>
             <a:pPr lvl="0"/>
             <a:r>
-              <a:rPr lang="en-US" smtClean="0"/>
+              <a:rPr lang="en-US"/>
               <a:t>Click to edit Master text styles</a:t>
             </a:r>
           </a:p>
@@ -574,7 +574,7 @@
           <a:p>
             <a:fld id="{4509A250-FF31-4206-8172-F9D3106AACB1}" type="datetimeFigureOut">
               <a:rPr lang="en-US" dirty="0"/>
-              <a:t>4/23/2019</a:t>
+              <a:t>2/25/2020</a:t>
             </a:fld>
             <a:endParaRPr lang="en-US" dirty="0"/>
           </a:p>
@@ -672,7 +672,7 @@
           </a:lstStyle>
           <a:p>
             <a:r>
-              <a:rPr lang="en-US" smtClean="0"/>
+              <a:rPr lang="en-US"/>
               <a:t>Click to edit Master title style</a:t>
             </a:r>
             <a:endParaRPr lang="en-US" dirty="0"/>
@@ -740,7 +740,7 @@
           <a:p>
             <a:pPr lvl="0"/>
             <a:r>
-              <a:rPr lang="en-US" smtClean="0"/>
+              <a:rPr lang="en-US"/>
               <a:t>Click to edit Master text styles</a:t>
             </a:r>
           </a:p>
@@ -763,7 +763,7 @@
           <a:p>
             <a:fld id="{4509A250-FF31-4206-8172-F9D3106AACB1}" type="datetimeFigureOut">
               <a:rPr lang="en-US" dirty="0"/>
-              <a:t>4/23/2019</a:t>
+              <a:t>2/25/2020</a:t>
             </a:fld>
             <a:endParaRPr lang="en-US" dirty="0"/>
           </a:p>
@@ -861,7 +861,7 @@
           </a:lstStyle>
           <a:p>
             <a:r>
-              <a:rPr lang="en-US" smtClean="0"/>
+              <a:rPr lang="en-US"/>
               <a:t>Click to edit Master title style</a:t>
             </a:r>
             <a:endParaRPr lang="en-US" dirty="0"/>
@@ -941,7 +941,7 @@
               <a:buNone/>
             </a:pPr>
             <a:r>
-              <a:rPr lang="en-US" smtClean="0"/>
+              <a:rPr lang="en-US"/>
               <a:t>Click to edit Master text styles</a:t>
             </a:r>
           </a:p>
@@ -1008,7 +1008,7 @@
           <a:p>
             <a:pPr lvl="0"/>
             <a:r>
-              <a:rPr lang="en-US" smtClean="0"/>
+              <a:rPr lang="en-US"/>
               <a:t>Click to edit Master text styles</a:t>
             </a:r>
           </a:p>
@@ -1031,7 +1031,7 @@
           <a:p>
             <a:fld id="{4509A250-FF31-4206-8172-F9D3106AACB1}" type="datetimeFigureOut">
               <a:rPr lang="en-US" dirty="0"/>
-              <a:t>4/23/2019</a:t>
+              <a:t>2/25/2020</a:t>
             </a:fld>
             <a:endParaRPr lang="en-US" dirty="0"/>
           </a:p>
@@ -1223,7 +1223,7 @@
           </a:lstStyle>
           <a:p>
             <a:r>
-              <a:rPr lang="en-US" smtClean="0"/>
+              <a:rPr lang="en-US"/>
               <a:t>Click to edit Master title style</a:t>
             </a:r>
             <a:endParaRPr lang="en-US" dirty="0"/>
@@ -1344,7 +1344,7 @@
           <a:p>
             <a:pPr lvl="0"/>
             <a:r>
-              <a:rPr lang="en-US" smtClean="0"/>
+              <a:rPr lang="en-US"/>
               <a:t>Click to edit Master text styles</a:t>
             </a:r>
           </a:p>
@@ -1367,7 +1367,7 @@
           <a:p>
             <a:fld id="{4509A250-FF31-4206-8172-F9D3106AACB1}" type="datetimeFigureOut">
               <a:rPr lang="en-US" dirty="0"/>
-              <a:t>4/23/2019</a:t>
+              <a:t>2/25/2020</a:t>
             </a:fld>
             <a:endParaRPr lang="en-US" dirty="0"/>
           </a:p>
@@ -1460,7 +1460,7 @@
           </a:lstStyle>
           <a:p>
             <a:r>
-              <a:rPr lang="en-US" smtClean="0"/>
+              <a:rPr lang="en-US"/>
               <a:t>Click to edit Master title style</a:t>
             </a:r>
             <a:endParaRPr lang="en-US" dirty="0"/>
@@ -1535,7 +1535,7 @@
           <a:p>
             <a:pPr lvl="0"/>
             <a:r>
-              <a:rPr lang="en-US" smtClean="0"/>
+              <a:rPr lang="en-US"/>
               <a:t>Click to edit Master text styles</a:t>
             </a:r>
           </a:p>
@@ -1602,7 +1602,7 @@
           <a:p>
             <a:pPr lvl="0"/>
             <a:r>
-              <a:rPr lang="en-US" smtClean="0"/>
+              <a:rPr lang="en-US"/>
               <a:t>Click to edit Master text styles</a:t>
             </a:r>
           </a:p>
@@ -1676,7 +1676,7 @@
           <a:p>
             <a:pPr lvl="0"/>
             <a:r>
-              <a:rPr lang="en-US" smtClean="0"/>
+              <a:rPr lang="en-US"/>
               <a:t>Click to edit Master text styles</a:t>
             </a:r>
           </a:p>
@@ -1743,7 +1743,7 @@
           <a:p>
             <a:pPr lvl="0"/>
             <a:r>
-              <a:rPr lang="en-US" smtClean="0"/>
+              <a:rPr lang="en-US"/>
               <a:t>Click to edit Master text styles</a:t>
             </a:r>
           </a:p>
@@ -1817,7 +1817,7 @@
           <a:p>
             <a:pPr lvl="0"/>
             <a:r>
-              <a:rPr lang="en-US" smtClean="0"/>
+              <a:rPr lang="en-US"/>
               <a:t>Click to edit Master text styles</a:t>
             </a:r>
           </a:p>
@@ -1884,7 +1884,7 @@
           <a:p>
             <a:pPr lvl="0"/>
             <a:r>
-              <a:rPr lang="en-US" smtClean="0"/>
+              <a:rPr lang="en-US"/>
               <a:t>Click to edit Master text styles</a:t>
             </a:r>
           </a:p>
@@ -1985,7 +1985,7 @@
           <a:p>
             <a:fld id="{4509A250-FF31-4206-8172-F9D3106AACB1}" type="datetimeFigureOut">
               <a:rPr lang="en-US" dirty="0"/>
-              <a:t>4/23/2019</a:t>
+              <a:t>2/25/2020</a:t>
             </a:fld>
             <a:endParaRPr lang="en-US" dirty="0"/>
           </a:p>
@@ -2078,7 +2078,7 @@
           </a:lstStyle>
           <a:p>
             <a:r>
-              <a:rPr lang="en-US" smtClean="0"/>
+              <a:rPr lang="en-US"/>
               <a:t>Click to edit Master title style</a:t>
             </a:r>
             <a:endParaRPr lang="en-US" dirty="0"/>
@@ -2153,7 +2153,7 @@
           <a:p>
             <a:pPr lvl="0"/>
             <a:r>
-              <a:rPr lang="en-US" smtClean="0"/>
+              <a:rPr lang="en-US"/>
               <a:t>Click to edit Master text styles</a:t>
             </a:r>
           </a:p>
@@ -2231,7 +2231,7 @@
           </a:lstStyle>
           <a:p>
             <a:r>
-              <a:rPr lang="en-US" smtClean="0"/>
+              <a:rPr lang="en-US"/>
               <a:t>Click icon to add picture</a:t>
             </a:r>
             <a:endParaRPr lang="en-US" dirty="0"/>
@@ -2299,7 +2299,7 @@
           <a:p>
             <a:pPr lvl="0"/>
             <a:r>
-              <a:rPr lang="en-US" smtClean="0"/>
+              <a:rPr lang="en-US"/>
               <a:t>Click to edit Master text styles</a:t>
             </a:r>
           </a:p>
@@ -2373,7 +2373,7 @@
           <a:p>
             <a:pPr lvl="0"/>
             <a:r>
-              <a:rPr lang="en-US" smtClean="0"/>
+              <a:rPr lang="en-US"/>
               <a:t>Click to edit Master text styles</a:t>
             </a:r>
           </a:p>
@@ -2451,7 +2451,7 @@
           </a:lstStyle>
           <a:p>
             <a:r>
-              <a:rPr lang="en-US" smtClean="0"/>
+              <a:rPr lang="en-US"/>
               <a:t>Click icon to add picture</a:t>
             </a:r>
             <a:endParaRPr lang="en-US" dirty="0"/>
@@ -2519,7 +2519,7 @@
           <a:p>
             <a:pPr lvl="0"/>
             <a:r>
-              <a:rPr lang="en-US" smtClean="0"/>
+              <a:rPr lang="en-US"/>
               <a:t>Click to edit Master text styles</a:t>
             </a:r>
           </a:p>
@@ -2593,7 +2593,7 @@
           <a:p>
             <a:pPr lvl="0"/>
             <a:r>
-              <a:rPr lang="en-US" smtClean="0"/>
+              <a:rPr lang="en-US"/>
               <a:t>Click to edit Master text styles</a:t>
             </a:r>
           </a:p>
@@ -2671,7 +2671,7 @@
           </a:lstStyle>
           <a:p>
             <a:r>
-              <a:rPr lang="en-US" smtClean="0"/>
+              <a:rPr lang="en-US"/>
               <a:t>Click icon to add picture</a:t>
             </a:r>
             <a:endParaRPr lang="en-US" dirty="0"/>
@@ -2739,7 +2739,7 @@
           <a:p>
             <a:pPr lvl="0"/>
             <a:r>
-              <a:rPr lang="en-US" smtClean="0"/>
+              <a:rPr lang="en-US"/>
               <a:t>Click to edit Master text styles</a:t>
             </a:r>
           </a:p>
@@ -2840,7 +2840,7 @@
           <a:p>
             <a:fld id="{4509A250-FF31-4206-8172-F9D3106AACB1}" type="datetimeFigureOut">
               <a:rPr lang="en-US" dirty="0"/>
-              <a:t>4/23/2019</a:t>
+              <a:t>2/25/2020</a:t>
             </a:fld>
             <a:endParaRPr lang="en-US" dirty="0"/>
           </a:p>
@@ -2929,7 +2929,7 @@
           <a:lstStyle/>
           <a:p>
             <a:r>
-              <a:rPr lang="en-US" smtClean="0"/>
+              <a:rPr lang="en-US"/>
               <a:t>Click to edit Master title style</a:t>
             </a:r>
             <a:endParaRPr lang="en-US" dirty="0"/>
@@ -2953,35 +2953,35 @@
           <a:p>
             <a:pPr lvl="0"/>
             <a:r>
-              <a:rPr lang="en-US" smtClean="0"/>
+              <a:rPr lang="en-US"/>
               <a:t>Click to edit Master text styles</a:t>
             </a:r>
           </a:p>
           <a:p>
             <a:pPr lvl="1"/>
             <a:r>
-              <a:rPr lang="en-US" smtClean="0"/>
+              <a:rPr lang="en-US"/>
               <a:t>Second level</a:t>
             </a:r>
           </a:p>
           <a:p>
             <a:pPr lvl="2"/>
             <a:r>
-              <a:rPr lang="en-US" smtClean="0"/>
+              <a:rPr lang="en-US"/>
               <a:t>Third level</a:t>
             </a:r>
           </a:p>
           <a:p>
             <a:pPr lvl="3"/>
             <a:r>
-              <a:rPr lang="en-US" smtClean="0"/>
+              <a:rPr lang="en-US"/>
               <a:t>Fourth level</a:t>
             </a:r>
           </a:p>
           <a:p>
             <a:pPr lvl="4"/>
             <a:r>
-              <a:rPr lang="en-US" smtClean="0"/>
+              <a:rPr lang="en-US"/>
               <a:t>Fifth level</a:t>
             </a:r>
             <a:endParaRPr lang="en-US" dirty="0"/>
@@ -3005,7 +3005,7 @@
           <a:p>
             <a:fld id="{4509A250-FF31-4206-8172-F9D3106AACB1}" type="datetimeFigureOut">
               <a:rPr lang="en-US" dirty="0"/>
-              <a:t>4/23/2019</a:t>
+              <a:t>2/25/2020</a:t>
             </a:fld>
             <a:endParaRPr lang="en-US" dirty="0"/>
           </a:p>
@@ -3099,7 +3099,7 @@
           <a:lstStyle/>
           <a:p>
             <a:r>
-              <a:rPr lang="en-US" smtClean="0"/>
+              <a:rPr lang="en-US"/>
               <a:t>Click to edit Master title style</a:t>
             </a:r>
             <a:endParaRPr lang="en-US" dirty="0"/>
@@ -3128,35 +3128,35 @@
           <a:p>
             <a:pPr lvl="0"/>
             <a:r>
-              <a:rPr lang="en-US" smtClean="0"/>
+              <a:rPr lang="en-US"/>
               <a:t>Click to edit Master text styles</a:t>
             </a:r>
           </a:p>
           <a:p>
             <a:pPr lvl="1"/>
             <a:r>
-              <a:rPr lang="en-US" smtClean="0"/>
+              <a:rPr lang="en-US"/>
               <a:t>Second level</a:t>
             </a:r>
           </a:p>
           <a:p>
             <a:pPr lvl="2"/>
             <a:r>
-              <a:rPr lang="en-US" smtClean="0"/>
+              <a:rPr lang="en-US"/>
               <a:t>Third level</a:t>
             </a:r>
           </a:p>
           <a:p>
             <a:pPr lvl="3"/>
             <a:r>
-              <a:rPr lang="en-US" smtClean="0"/>
+              <a:rPr lang="en-US"/>
               <a:t>Fourth level</a:t>
             </a:r>
           </a:p>
           <a:p>
             <a:pPr lvl="4"/>
             <a:r>
-              <a:rPr lang="en-US" smtClean="0"/>
+              <a:rPr lang="en-US"/>
               <a:t>Fifth level</a:t>
             </a:r>
             <a:endParaRPr lang="en-US" dirty="0"/>
@@ -3180,7 +3180,7 @@
           <a:p>
             <a:fld id="{4509A250-FF31-4206-8172-F9D3106AACB1}" type="datetimeFigureOut">
               <a:rPr lang="en-US" dirty="0"/>
-              <a:t>4/23/2019</a:t>
+              <a:t>2/25/2020</a:t>
             </a:fld>
             <a:endParaRPr lang="en-US" dirty="0"/>
           </a:p>
@@ -3269,7 +3269,7 @@
           <a:lstStyle/>
           <a:p>
             <a:r>
-              <a:rPr lang="en-US" smtClean="0"/>
+              <a:rPr lang="en-US"/>
               <a:t>Click to edit Master title style</a:t>
             </a:r>
             <a:endParaRPr lang="en-US" dirty="0"/>
@@ -3293,35 +3293,35 @@
           <a:p>
             <a:pPr lvl="0"/>
             <a:r>
-              <a:rPr lang="en-US" smtClean="0"/>
+              <a:rPr lang="en-US"/>
               <a:t>Click to edit Master text styles</a:t>
             </a:r>
           </a:p>
           <a:p>
             <a:pPr lvl="1"/>
             <a:r>
-              <a:rPr lang="en-US" smtClean="0"/>
+              <a:rPr lang="en-US"/>
               <a:t>Second level</a:t>
             </a:r>
           </a:p>
           <a:p>
             <a:pPr lvl="2"/>
             <a:r>
-              <a:rPr lang="en-US" smtClean="0"/>
+              <a:rPr lang="en-US"/>
               <a:t>Third level</a:t>
             </a:r>
           </a:p>
           <a:p>
             <a:pPr lvl="3"/>
             <a:r>
-              <a:rPr lang="en-US" smtClean="0"/>
+              <a:rPr lang="en-US"/>
               <a:t>Fourth level</a:t>
             </a:r>
           </a:p>
           <a:p>
             <a:pPr lvl="4"/>
             <a:r>
-              <a:rPr lang="en-US" smtClean="0"/>
+              <a:rPr lang="en-US"/>
               <a:t>Fifth level</a:t>
             </a:r>
             <a:endParaRPr lang="en-US" dirty="0"/>
@@ -3345,7 +3345,7 @@
           <a:p>
             <a:fld id="{4509A250-FF31-4206-8172-F9D3106AACB1}" type="datetimeFigureOut">
               <a:rPr lang="en-US" dirty="0"/>
-              <a:t>4/23/2019</a:t>
+              <a:t>2/25/2020</a:t>
             </a:fld>
             <a:endParaRPr lang="en-US" dirty="0"/>
           </a:p>
@@ -3443,7 +3443,7 @@
           </a:lstStyle>
           <a:p>
             <a:r>
-              <a:rPr lang="en-US" smtClean="0"/>
+              <a:rPr lang="en-US"/>
               <a:t>Click to edit Master title style</a:t>
             </a:r>
             <a:endParaRPr lang="en-US" dirty="0"/>
@@ -3564,7 +3564,7 @@
           <a:p>
             <a:pPr lvl="0"/>
             <a:r>
-              <a:rPr lang="en-US" smtClean="0"/>
+              <a:rPr lang="en-US"/>
               <a:t>Click to edit Master text styles</a:t>
             </a:r>
           </a:p>
@@ -3587,7 +3587,7 @@
           <a:p>
             <a:fld id="{9796027F-7875-4030-9381-8BD8C4F21935}" type="datetimeFigureOut">
               <a:rPr lang="en-US" dirty="0"/>
-              <a:t>4/23/2019</a:t>
+              <a:t>2/25/2020</a:t>
             </a:fld>
             <a:endParaRPr lang="en-US" dirty="0"/>
           </a:p>
@@ -3676,7 +3676,7 @@
           <a:lstStyle/>
           <a:p>
             <a:r>
-              <a:rPr lang="en-US" smtClean="0"/>
+              <a:rPr lang="en-US"/>
               <a:t>Click to edit Master title style</a:t>
             </a:r>
             <a:endParaRPr lang="en-US" dirty="0"/>
@@ -3735,35 +3735,35 @@
           <a:p>
             <a:pPr lvl="0"/>
             <a:r>
-              <a:rPr lang="en-US" smtClean="0"/>
+              <a:rPr lang="en-US"/>
               <a:t>Click to edit Master text styles</a:t>
             </a:r>
           </a:p>
           <a:p>
             <a:pPr lvl="1"/>
             <a:r>
-              <a:rPr lang="en-US" smtClean="0"/>
+              <a:rPr lang="en-US"/>
               <a:t>Second level</a:t>
             </a:r>
           </a:p>
           <a:p>
             <a:pPr lvl="2"/>
             <a:r>
-              <a:rPr lang="en-US" smtClean="0"/>
+              <a:rPr lang="en-US"/>
               <a:t>Third level</a:t>
             </a:r>
           </a:p>
           <a:p>
             <a:pPr lvl="3"/>
             <a:r>
-              <a:rPr lang="en-US" smtClean="0"/>
+              <a:rPr lang="en-US"/>
               <a:t>Fourth level</a:t>
             </a:r>
           </a:p>
           <a:p>
             <a:pPr lvl="4"/>
             <a:r>
-              <a:rPr lang="en-US" smtClean="0"/>
+              <a:rPr lang="en-US"/>
               <a:t>Fifth level</a:t>
             </a:r>
             <a:endParaRPr lang="en-US" dirty="0"/>
@@ -3822,35 +3822,35 @@
           <a:p>
             <a:pPr lvl="0"/>
             <a:r>
-              <a:rPr lang="en-US" smtClean="0"/>
+              <a:rPr lang="en-US"/>
               <a:t>Click to edit Master text styles</a:t>
             </a:r>
           </a:p>
           <a:p>
             <a:pPr lvl="1"/>
             <a:r>
-              <a:rPr lang="en-US" smtClean="0"/>
+              <a:rPr lang="en-US"/>
               <a:t>Second level</a:t>
             </a:r>
           </a:p>
           <a:p>
             <a:pPr lvl="2"/>
             <a:r>
-              <a:rPr lang="en-US" smtClean="0"/>
+              <a:rPr lang="en-US"/>
               <a:t>Third level</a:t>
             </a:r>
           </a:p>
           <a:p>
             <a:pPr lvl="3"/>
             <a:r>
-              <a:rPr lang="en-US" smtClean="0"/>
+              <a:rPr lang="en-US"/>
               <a:t>Fourth level</a:t>
             </a:r>
           </a:p>
           <a:p>
             <a:pPr lvl="4"/>
             <a:r>
-              <a:rPr lang="en-US" smtClean="0"/>
+              <a:rPr lang="en-US"/>
               <a:t>Fifth level</a:t>
             </a:r>
             <a:endParaRPr lang="en-US" dirty="0"/>
@@ -3874,7 +3874,7 @@
           <a:p>
             <a:fld id="{9796027F-7875-4030-9381-8BD8C4F21935}" type="datetimeFigureOut">
               <a:rPr lang="en-US" dirty="0"/>
-              <a:t>4/23/2019</a:t>
+              <a:t>2/25/2020</a:t>
             </a:fld>
             <a:endParaRPr lang="en-US" dirty="0"/>
           </a:p>
@@ -3967,7 +3967,7 @@
           </a:lstStyle>
           <a:p>
             <a:r>
-              <a:rPr lang="en-US" smtClean="0"/>
+              <a:rPr lang="en-US"/>
               <a:t>Click to edit Master title style</a:t>
             </a:r>
             <a:endParaRPr lang="en-US" dirty="0"/>
@@ -4042,7 +4042,7 @@
           <a:p>
             <a:pPr lvl="0"/>
             <a:r>
-              <a:rPr lang="en-US" smtClean="0"/>
+              <a:rPr lang="en-US"/>
               <a:t>Click to edit Master text styles</a:t>
             </a:r>
           </a:p>
@@ -4100,35 +4100,35 @@
           <a:p>
             <a:pPr lvl="0"/>
             <a:r>
-              <a:rPr lang="en-US" smtClean="0"/>
+              <a:rPr lang="en-US"/>
               <a:t>Click to edit Master text styles</a:t>
             </a:r>
           </a:p>
           <a:p>
             <a:pPr lvl="1"/>
             <a:r>
-              <a:rPr lang="en-US" smtClean="0"/>
+              <a:rPr lang="en-US"/>
               <a:t>Second level</a:t>
             </a:r>
           </a:p>
           <a:p>
             <a:pPr lvl="2"/>
             <a:r>
-              <a:rPr lang="en-US" smtClean="0"/>
+              <a:rPr lang="en-US"/>
               <a:t>Third level</a:t>
             </a:r>
           </a:p>
           <a:p>
             <a:pPr lvl="3"/>
             <a:r>
-              <a:rPr lang="en-US" smtClean="0"/>
+              <a:rPr lang="en-US"/>
               <a:t>Fourth level</a:t>
             </a:r>
           </a:p>
           <a:p>
             <a:pPr lvl="4"/>
             <a:r>
-              <a:rPr lang="en-US" smtClean="0"/>
+              <a:rPr lang="en-US"/>
               <a:t>Fifth level</a:t>
             </a:r>
             <a:endParaRPr lang="en-US" dirty="0"/>
@@ -4203,7 +4203,7 @@
           <a:p>
             <a:pPr lvl="0"/>
             <a:r>
-              <a:rPr lang="en-US" smtClean="0"/>
+              <a:rPr lang="en-US"/>
               <a:t>Click to edit Master text styles</a:t>
             </a:r>
           </a:p>
@@ -4261,35 +4261,35 @@
           <a:p>
             <a:pPr lvl="0"/>
             <a:r>
-              <a:rPr lang="en-US" smtClean="0"/>
+              <a:rPr lang="en-US"/>
               <a:t>Click to edit Master text styles</a:t>
             </a:r>
           </a:p>
           <a:p>
             <a:pPr lvl="1"/>
             <a:r>
-              <a:rPr lang="en-US" smtClean="0"/>
+              <a:rPr lang="en-US"/>
               <a:t>Second level</a:t>
             </a:r>
           </a:p>
           <a:p>
             <a:pPr lvl="2"/>
             <a:r>
-              <a:rPr lang="en-US" smtClean="0"/>
+              <a:rPr lang="en-US"/>
               <a:t>Third level</a:t>
             </a:r>
           </a:p>
           <a:p>
             <a:pPr lvl="3"/>
             <a:r>
-              <a:rPr lang="en-US" smtClean="0"/>
+              <a:rPr lang="en-US"/>
               <a:t>Fourth level</a:t>
             </a:r>
           </a:p>
           <a:p>
             <a:pPr lvl="4"/>
             <a:r>
-              <a:rPr lang="en-US" smtClean="0"/>
+              <a:rPr lang="en-US"/>
               <a:t>Fifth level</a:t>
             </a:r>
             <a:endParaRPr lang="en-US" dirty="0"/>
@@ -4313,7 +4313,7 @@
           <a:p>
             <a:fld id="{9796027F-7875-4030-9381-8BD8C4F21935}" type="datetimeFigureOut">
               <a:rPr lang="en-US" dirty="0"/>
-              <a:t>4/23/2019</a:t>
+              <a:t>2/25/2020</a:t>
             </a:fld>
             <a:endParaRPr lang="en-US" dirty="0"/>
           </a:p>
@@ -4402,7 +4402,7 @@
           <a:lstStyle/>
           <a:p>
             <a:r>
-              <a:rPr lang="en-US" smtClean="0"/>
+              <a:rPr lang="en-US"/>
               <a:t>Click to edit Master title style</a:t>
             </a:r>
             <a:endParaRPr lang="en-US" dirty="0"/>
@@ -4426,7 +4426,7 @@
           <a:p>
             <a:fld id="{4509A250-FF31-4206-8172-F9D3106AACB1}" type="datetimeFigureOut">
               <a:rPr lang="en-US" dirty="0"/>
-              <a:t>4/23/2019</a:t>
+              <a:t>2/25/2020</a:t>
             </a:fld>
             <a:endParaRPr lang="en-US" dirty="0"/>
           </a:p>
@@ -4516,7 +4516,7 @@
           <a:p>
             <a:fld id="{4509A250-FF31-4206-8172-F9D3106AACB1}" type="datetimeFigureOut">
               <a:rPr lang="en-US" dirty="0"/>
-              <a:t>4/23/2019</a:t>
+              <a:t>2/25/2020</a:t>
             </a:fld>
             <a:endParaRPr lang="en-US" dirty="0"/>
           </a:p>
@@ -4614,7 +4614,7 @@
           </a:lstStyle>
           <a:p>
             <a:r>
-              <a:rPr lang="en-US" smtClean="0"/>
+              <a:rPr lang="en-US"/>
               <a:t>Click to edit Master title style</a:t>
             </a:r>
             <a:endParaRPr lang="en-US" dirty="0"/>
@@ -4673,35 +4673,35 @@
           <a:p>
             <a:pPr lvl="0"/>
             <a:r>
-              <a:rPr lang="en-US" smtClean="0"/>
+              <a:rPr lang="en-US"/>
               <a:t>Click to edit Master text styles</a:t>
             </a:r>
           </a:p>
           <a:p>
             <a:pPr lvl="1"/>
             <a:r>
-              <a:rPr lang="en-US" smtClean="0"/>
+              <a:rPr lang="en-US"/>
               <a:t>Second level</a:t>
             </a:r>
           </a:p>
           <a:p>
             <a:pPr lvl="2"/>
             <a:r>
-              <a:rPr lang="en-US" smtClean="0"/>
+              <a:rPr lang="en-US"/>
               <a:t>Third level</a:t>
             </a:r>
           </a:p>
           <a:p>
             <a:pPr lvl="3"/>
             <a:r>
-              <a:rPr lang="en-US" smtClean="0"/>
+              <a:rPr lang="en-US"/>
               <a:t>Fourth level</a:t>
             </a:r>
           </a:p>
           <a:p>
             <a:pPr lvl="4"/>
             <a:r>
-              <a:rPr lang="en-US" smtClean="0"/>
+              <a:rPr lang="en-US"/>
               <a:t>Fifth level</a:t>
             </a:r>
             <a:endParaRPr lang="en-US" dirty="0"/>
@@ -4767,7 +4767,7 @@
           <a:p>
             <a:pPr lvl="0"/>
             <a:r>
-              <a:rPr lang="en-US" smtClean="0"/>
+              <a:rPr lang="en-US"/>
               <a:t>Click to edit Master text styles</a:t>
             </a:r>
           </a:p>
@@ -4790,7 +4790,7 @@
           <a:p>
             <a:fld id="{4509A250-FF31-4206-8172-F9D3106AACB1}" type="datetimeFigureOut">
               <a:rPr lang="en-US" dirty="0"/>
-              <a:t>4/23/2019</a:t>
+              <a:t>2/25/2020</a:t>
             </a:fld>
             <a:endParaRPr lang="en-US" dirty="0"/>
           </a:p>
@@ -4890,7 +4890,7 @@
           </a:lstStyle>
           <a:p>
             <a:r>
-              <a:rPr lang="en-US" smtClean="0"/>
+              <a:rPr lang="en-US"/>
               <a:t>Click to edit Master title style</a:t>
             </a:r>
             <a:endParaRPr lang="en-US" dirty="0"/>
@@ -4969,7 +4969,7 @@
           </a:lstStyle>
           <a:p>
             <a:r>
-              <a:rPr lang="en-US" smtClean="0"/>
+              <a:rPr lang="en-US"/>
               <a:t>Click icon to add picture</a:t>
             </a:r>
             <a:endParaRPr lang="en-US" dirty="0"/>
@@ -5037,7 +5037,7 @@
           <a:p>
             <a:pPr lvl="0"/>
             <a:r>
-              <a:rPr lang="en-US" smtClean="0"/>
+              <a:rPr lang="en-US"/>
               <a:t>Click to edit Master text styles</a:t>
             </a:r>
           </a:p>
@@ -5060,7 +5060,7 @@
           <a:p>
             <a:fld id="{4509A250-FF31-4206-8172-F9D3106AACB1}" type="datetimeFigureOut">
               <a:rPr lang="en-US" dirty="0"/>
-              <a:t>4/23/2019</a:t>
+              <a:t>2/25/2020</a:t>
             </a:fld>
             <a:endParaRPr lang="en-US" dirty="0"/>
           </a:p>
@@ -5379,7 +5379,7 @@
           <a:lstStyle/>
           <a:p>
             <a:r>
-              <a:rPr lang="en-US" smtClean="0"/>
+              <a:rPr lang="en-US"/>
               <a:t>Click to edit Master title style</a:t>
             </a:r>
             <a:endParaRPr lang="en-US" dirty="0"/>
@@ -5413,35 +5413,35 @@
           <a:p>
             <a:pPr lvl="0"/>
             <a:r>
-              <a:rPr lang="en-US" smtClean="0"/>
+              <a:rPr lang="en-US"/>
               <a:t>Click to edit Master text styles</a:t>
             </a:r>
           </a:p>
           <a:p>
             <a:pPr lvl="1"/>
             <a:r>
-              <a:rPr lang="en-US" smtClean="0"/>
+              <a:rPr lang="en-US"/>
               <a:t>Second level</a:t>
             </a:r>
           </a:p>
           <a:p>
             <a:pPr lvl="2"/>
             <a:r>
-              <a:rPr lang="en-US" smtClean="0"/>
+              <a:rPr lang="en-US"/>
               <a:t>Third level</a:t>
             </a:r>
           </a:p>
           <a:p>
             <a:pPr lvl="3"/>
             <a:r>
-              <a:rPr lang="en-US" smtClean="0"/>
+              <a:rPr lang="en-US"/>
               <a:t>Fourth level</a:t>
             </a:r>
           </a:p>
           <a:p>
             <a:pPr lvl="4"/>
             <a:r>
-              <a:rPr lang="en-US" smtClean="0"/>
+              <a:rPr lang="en-US"/>
               <a:t>Fifth level</a:t>
             </a:r>
             <a:endParaRPr lang="en-US" dirty="0"/>
@@ -5484,7 +5484,7 @@
           <a:p>
             <a:fld id="{4AAD347D-5ACD-4C99-B74B-A9C85AD731AF}" type="datetimeFigureOut">
               <a:rPr lang="en-US" dirty="0"/>
-              <a:t>4/23/2019</a:t>
+              <a:t>2/25/2020</a:t>
             </a:fld>
             <a:endParaRPr lang="en-US" dirty="0"/>
           </a:p>
@@ -6029,30 +6029,18 @@
               <a:t>TDL – </a:t>
             </a:r>
             <a:r>
-              <a:rPr lang="en-US" sz="4400" b="1" dirty="0" smtClean="0"/>
+              <a:rPr lang="en-US" sz="4400" b="1" dirty="0"/>
               <a:t>Tests Definition Language</a:t>
-            </a:r>
-            <a:br>
-              <a:rPr lang="en-US" sz="4400" b="1" dirty="0" smtClean="0"/>
-            </a:br>
-            <a:r>
-              <a:rPr lang="en-US" sz="4400" b="1" dirty="0"/>
-              <a:t/>
             </a:r>
             <a:br>
               <a:rPr lang="en-US" sz="4400" b="1" dirty="0"/>
             </a:br>
-            <a:r>
-              <a:rPr lang="en-US" sz="4400" b="1" dirty="0" smtClean="0"/>
-              <a:t/>
-            </a:r>
             <a:br>
-              <a:rPr lang="en-US" sz="4400" b="1" dirty="0" smtClean="0"/>
+              <a:rPr lang="en-US" sz="4400" b="1" dirty="0"/>
             </a:br>
-            <a:r>
+            <a:br>
               <a:rPr lang="en-US" sz="4400" b="1" dirty="0"/>
-              <a:t/>
-            </a:r>
+            </a:br>
             <a:br>
               <a:rPr lang="en-US" sz="4400" b="1" dirty="0"/>
             </a:br>
@@ -6147,66 +6135,66 @@
           <a:lstStyle/>
           <a:p>
             <a:r>
-              <a:rPr lang="ru-RU" dirty="0" smtClean="0"/>
+              <a:rPr lang="ru-RU" dirty="0"/>
               <a:t>Описание тестовых сценариев из тестовых методов и других примитивов</a:t>
             </a:r>
           </a:p>
           <a:p>
             <a:r>
-              <a:rPr lang="ru-RU" dirty="0" smtClean="0"/>
+              <a:rPr lang="ru-RU" dirty="0"/>
               <a:t>Проверка формальной корректности описаний во время компиляции</a:t>
             </a:r>
           </a:p>
           <a:p>
             <a:r>
-              <a:rPr lang="ru-RU" dirty="0" smtClean="0"/>
+              <a:rPr lang="ru-RU" dirty="0"/>
               <a:t>Сокрытие деталей реализации</a:t>
             </a:r>
           </a:p>
           <a:p>
             <a:r>
-              <a:rPr lang="ru-RU" dirty="0" smtClean="0"/>
+              <a:rPr lang="ru-RU" dirty="0"/>
               <a:t>Повышение читаемости описаний</a:t>
             </a:r>
           </a:p>
           <a:p>
             <a:r>
-              <a:rPr lang="ru-RU" dirty="0" smtClean="0"/>
+              <a:rPr lang="ru-RU" dirty="0"/>
               <a:t>Упрощение редактирования за счет поддержки </a:t>
             </a:r>
             <a:r>
-              <a:rPr lang="en-US" dirty="0" smtClean="0"/>
+              <a:rPr lang="en-US" dirty="0"/>
               <a:t>IDE</a:t>
             </a:r>
             <a:r>
-              <a:rPr lang="ru-RU" dirty="0" smtClean="0"/>
+              <a:rPr lang="ru-RU" dirty="0"/>
               <a:t> (подсветка, </a:t>
             </a:r>
             <a:r>
-              <a:rPr lang="ru-RU" dirty="0" err="1" smtClean="0"/>
+              <a:rPr lang="ru-RU" dirty="0" err="1"/>
               <a:t>автодополнение</a:t>
             </a:r>
             <a:r>
-              <a:rPr lang="ru-RU" dirty="0" smtClean="0"/>
+              <a:rPr lang="ru-RU" dirty="0"/>
               <a:t> при вводе, навигация по символам)</a:t>
             </a:r>
           </a:p>
           <a:p>
             <a:r>
-              <a:rPr lang="ru-RU" dirty="0" smtClean="0"/>
+              <a:rPr lang="ru-RU" dirty="0"/>
               <a:t>Возможность автоматизированного </a:t>
             </a:r>
             <a:r>
-              <a:rPr lang="ru-RU" dirty="0" err="1" smtClean="0"/>
+              <a:rPr lang="ru-RU" dirty="0" err="1"/>
               <a:t>рефакторинга</a:t>
             </a:r>
             <a:r>
-              <a:rPr lang="ru-RU" dirty="0" smtClean="0"/>
+              <a:rPr lang="ru-RU" dirty="0"/>
               <a:t> и анализа кода тестов</a:t>
             </a:r>
           </a:p>
           <a:p>
-            <a:endParaRPr lang="ru-RU" dirty="0" smtClean="0"/>
+            <a:endParaRPr lang="ru-RU" dirty="0"/>
           </a:p>
         </p:txBody>
       </p:sp>
@@ -6357,10 +6345,9 @@
           <a:lstStyle/>
           <a:p>
             <a:r>
-              <a:rPr lang="ru-RU" dirty="0" smtClean="0"/>
+              <a:rPr lang="ru-RU" dirty="0"/>
               <a:t>Создание теста</a:t>
             </a:r>
-            <a:endParaRPr lang="ru-RU" dirty="0"/>
           </a:p>
         </p:txBody>
       </p:sp>
@@ -6380,89 +6367,89 @@
           <a:lstStyle/>
           <a:p>
             <a:r>
-              <a:rPr lang="ru-RU" dirty="0" smtClean="0"/>
+              <a:rPr lang="ru-RU" dirty="0"/>
               <a:t>Написание тестового метода</a:t>
             </a:r>
           </a:p>
           <a:p>
             <a:r>
-              <a:rPr lang="ru-RU" dirty="0" smtClean="0"/>
+              <a:rPr lang="ru-RU" dirty="0"/>
               <a:t>Добавление тестового метода в тестовый сценарий</a:t>
             </a:r>
           </a:p>
           <a:p>
             <a:r>
-              <a:rPr lang="ru-RU" dirty="0" smtClean="0"/>
+              <a:rPr lang="ru-RU" dirty="0"/>
               <a:t>Формирование из сценариев их групп</a:t>
             </a:r>
           </a:p>
           <a:p>
             <a:r>
-              <a:rPr lang="ru-RU" dirty="0" smtClean="0"/>
+              <a:rPr lang="ru-RU" dirty="0"/>
               <a:t>Создание или </a:t>
             </a:r>
             <a:r>
-              <a:rPr lang="ru-RU" dirty="0" err="1" smtClean="0"/>
+              <a:rPr lang="ru-RU" dirty="0" err="1"/>
               <a:t>переиспользование</a:t>
             </a:r>
             <a:r>
-              <a:rPr lang="ru-RU" dirty="0" smtClean="0"/>
+              <a:rPr lang="ru-RU" dirty="0"/>
               <a:t> описаний деплойментов</a:t>
             </a:r>
           </a:p>
           <a:p>
             <a:r>
-              <a:rPr lang="ru-RU" dirty="0" smtClean="0"/>
+              <a:rPr lang="ru-RU" dirty="0"/>
               <a:t>Формирование </a:t>
             </a:r>
             <a:r>
-              <a:rPr lang="en-US" dirty="0" smtClean="0"/>
+              <a:rPr lang="en-US" dirty="0"/>
               <a:t>suite</a:t>
             </a:r>
             <a:r>
-              <a:rPr lang="ru-RU" dirty="0" smtClean="0"/>
+              <a:rPr lang="ru-RU" dirty="0"/>
               <a:t> включающего тестовый сценарий или добавление сценария в имеющийся </a:t>
             </a:r>
             <a:r>
-              <a:rPr lang="en-US" dirty="0" smtClean="0"/>
+              <a:rPr lang="en-US" dirty="0"/>
               <a:t>suite</a:t>
             </a:r>
             <a:r>
-              <a:rPr lang="ru-RU" dirty="0" smtClean="0"/>
+              <a:rPr lang="ru-RU" dirty="0"/>
               <a:t>ю</a:t>
             </a:r>
           </a:p>
           <a:p>
             <a:r>
-              <a:rPr lang="ru-RU" dirty="0" smtClean="0"/>
+              <a:rPr lang="ru-RU" dirty="0"/>
               <a:t>Компиляция </a:t>
             </a:r>
             <a:r>
-              <a:rPr lang="en-US" dirty="0" smtClean="0"/>
+              <a:rPr lang="en-US" dirty="0"/>
               <a:t>TDL</a:t>
             </a:r>
             <a:r>
-              <a:rPr lang="ru-RU" dirty="0" smtClean="0"/>
+              <a:rPr lang="ru-RU" dirty="0"/>
               <a:t>-файлов и сборок (если тесты описаны в них) в .</a:t>
             </a:r>
             <a:r>
-              <a:rPr lang="en-US" dirty="0" smtClean="0"/>
+              <a:rPr lang="en-US" dirty="0"/>
               <a:t>json-</a:t>
             </a:r>
             <a:r>
-              <a:rPr lang="ru-RU" dirty="0" smtClean="0"/>
+              <a:rPr lang="ru-RU" dirty="0"/>
               <a:t>файл в формате </a:t>
             </a:r>
             <a:r>
-              <a:rPr lang="en-US" dirty="0" smtClean="0"/>
+              <a:rPr lang="en-US" dirty="0"/>
               <a:t>Starter/Warden (</a:t>
             </a:r>
             <a:r>
-              <a:rPr lang="ru-RU" dirty="0" smtClean="0"/>
+              <a:rPr lang="ru-RU" dirty="0"/>
               <a:t>выполняющих тесты в хайв</a:t>
             </a:r>
             <a:r>
-              <a:rPr lang="en-US" dirty="0" smtClean="0"/>
+              <a:rPr lang="en-US" dirty="0"/>
               <a:t>).</a:t>
             </a:r>
             <a:endParaRPr lang="ru-RU" dirty="0"/>
@@ -6555,18 +6542,6 @@
           </a:p>
           <a:p>
             <a:r>
-              <a:rPr lang="en-US" dirty="0" smtClean="0"/>
-              <a:t>p</a:t>
-            </a:r>
-            <a:r>
-              <a:rPr lang="ru-RU" dirty="0" err="1" smtClean="0"/>
-              <a:t>latform</a:t>
-            </a:r>
-            <a:endParaRPr lang="en-US" dirty="0" smtClean="0"/>
-          </a:p>
-          <a:p>
-            <a:pPr lvl="1"/>
-            <a:r>
               <a:rPr lang="en-US" dirty="0"/>
               <a:t>p</a:t>
             </a:r>
@@ -6574,12 +6549,24 @@
               <a:rPr lang="ru-RU" dirty="0" err="1"/>
               <a:t>latform</a:t>
             </a:r>
+            <a:endParaRPr lang="en-US" dirty="0"/>
+          </a:p>
+          <a:p>
+            <a:pPr lvl="1"/>
+            <a:r>
+              <a:rPr lang="en-US" dirty="0"/>
+              <a:t>p</a:t>
+            </a:r>
+            <a:r>
+              <a:rPr lang="ru-RU" dirty="0" err="1"/>
+              <a:t>latform</a:t>
+            </a:r>
             <a:r>
               <a:rPr lang="ru-RU" dirty="0"/>
               <a:t> </a:t>
             </a:r>
             <a:r>
-              <a:rPr lang="en-US" dirty="0" smtClean="0"/>
+              <a:rPr lang="en-US" dirty="0"/>
               <a:t>group</a:t>
             </a:r>
             <a:endParaRPr lang="ru-RU" dirty="0"/>
@@ -6594,13 +6581,9 @@
             <a:pPr lvl="1"/>
             <a:r>
               <a:rPr lang="ru-RU" dirty="0"/>
-              <a:t>product </a:t>
-            </a:r>
-            <a:r>
-              <a:rPr lang="ru-RU" dirty="0" smtClean="0"/>
-              <a:t>type</a:t>
-            </a:r>
-            <a:endParaRPr lang="en-US" dirty="0" smtClean="0"/>
+              <a:t>product type</a:t>
+            </a:r>
+            <a:endParaRPr lang="en-US" dirty="0"/>
           </a:p>
           <a:p>
             <a:pPr lvl="1"/>
@@ -6609,40 +6592,40 @@
               <a:t>product </a:t>
             </a:r>
             <a:r>
-              <a:rPr lang="en-US" dirty="0" smtClean="0"/>
+              <a:rPr lang="en-US" dirty="0"/>
               <a:t>group</a:t>
             </a:r>
             <a:endParaRPr lang="ru-RU" dirty="0"/>
           </a:p>
           <a:p>
-            <a:r>
-              <a:rPr lang="ru-RU" dirty="0" smtClean="0"/>
-              <a:t>deployment</a:t>
-            </a:r>
-            <a:endParaRPr lang="en-US" dirty="0" smtClean="0"/>
-          </a:p>
-          <a:p>
-            <a:pPr lvl="1"/>
-            <a:r>
-              <a:rPr lang="en-US" dirty="0" smtClean="0"/>
-              <a:t>script </a:t>
-            </a:r>
-            <a:r>
-              <a:rPr lang="ru-RU" dirty="0" smtClean="0"/>
-              <a:t>deployment</a:t>
-            </a:r>
-          </a:p>
-          <a:p>
-            <a:pPr lvl="1"/>
-            <a:r>
-              <a:rPr lang="en-US" dirty="0" smtClean="0"/>
-              <a:t>C# </a:t>
-            </a:r>
             <a:r>
               <a:rPr lang="ru-RU" dirty="0"/>
               <a:t>deployment</a:t>
             </a:r>
-            <a:endParaRPr lang="en-US" dirty="0" smtClean="0"/>
+            <a:endParaRPr lang="en-US" dirty="0"/>
+          </a:p>
+          <a:p>
+            <a:pPr lvl="1"/>
+            <a:r>
+              <a:rPr lang="en-US" dirty="0"/>
+              <a:t>script </a:t>
+            </a:r>
+            <a:r>
+              <a:rPr lang="ru-RU" dirty="0"/>
+              <a:t>deployment</a:t>
+            </a:r>
+          </a:p>
+          <a:p>
+            <a:pPr lvl="1"/>
+            <a:r>
+              <a:rPr lang="en-US" dirty="0"/>
+              <a:t>C# </a:t>
+            </a:r>
+            <a:r>
+              <a:rPr lang="ru-RU" dirty="0"/>
+              <a:t>deployment</a:t>
+            </a:r>
+            <a:endParaRPr lang="en-US" dirty="0"/>
           </a:p>
           <a:p>
             <a:pPr lvl="1"/>
@@ -6651,26 +6634,26 @@
               <a:t>deployment </a:t>
             </a:r>
             <a:r>
-              <a:rPr lang="en-US" dirty="0" smtClean="0"/>
+              <a:rPr lang="en-US" dirty="0"/>
               <a:t>group</a:t>
             </a:r>
           </a:p>
           <a:p>
             <a:pPr lvl="1"/>
             <a:r>
-              <a:rPr lang="en-US" dirty="0" smtClean="0"/>
+              <a:rPr lang="en-US" dirty="0"/>
               <a:t>currying </a:t>
             </a:r>
             <a:r>
-              <a:rPr lang="ru-RU" dirty="0" smtClean="0"/>
+              <a:rPr lang="ru-RU" dirty="0"/>
               <a:t>deployment</a:t>
             </a:r>
-            <a:endParaRPr lang="en-US" dirty="0" smtClean="0"/>
+            <a:endParaRPr lang="en-US" dirty="0"/>
           </a:p>
           <a:p>
             <a:pPr lvl="1"/>
             <a:r>
-              <a:rPr lang="en-US" dirty="0" smtClean="0"/>
+              <a:rPr lang="en-US" dirty="0"/>
               <a:t>select </a:t>
             </a:r>
             <a:r>
@@ -6768,17 +6751,13 @@
             <a:pPr lvl="1"/>
             <a:r>
               <a:rPr lang="en-US" dirty="0"/>
-              <a:t>scenario </a:t>
-            </a:r>
-            <a:r>
-              <a:rPr lang="en-US" dirty="0" smtClean="0"/>
-              <a:t>group</a:t>
+              <a:t>scenario group</a:t>
             </a:r>
           </a:p>
           <a:p>
             <a:pPr lvl="1"/>
             <a:r>
-              <a:rPr lang="ru-RU" dirty="0" smtClean="0"/>
+              <a:rPr lang="ru-RU" dirty="0"/>
               <a:t>поддержка .</a:t>
             </a:r>
             <a:r>
@@ -6793,7 +6772,7 @@
           <a:p>
             <a:pPr lvl="1"/>
             <a:r>
-              <a:rPr lang="ru-RU" dirty="0" smtClean="0"/>
+              <a:rPr lang="ru-RU" dirty="0"/>
               <a:t>поддержка </a:t>
             </a:r>
             <a:r>
@@ -6808,7 +6787,7 @@
           <a:p>
             <a:pPr lvl="1"/>
             <a:r>
-              <a:rPr lang="ru-RU" dirty="0" smtClean="0"/>
+              <a:rPr lang="ru-RU" dirty="0"/>
               <a:t>поддержка </a:t>
             </a:r>
             <a:r>
@@ -6823,7 +6802,7 @@
           <a:p>
             <a:pPr lvl="1"/>
             <a:r>
-              <a:rPr lang="ru-RU" dirty="0" smtClean="0"/>
+              <a:rPr lang="ru-RU" dirty="0"/>
               <a:t>поддержка </a:t>
             </a:r>
             <a:r>
@@ -6838,70 +6817,53 @@
           <a:p>
             <a:pPr lvl="1"/>
             <a:r>
-              <a:rPr lang="ru-RU" dirty="0" smtClean="0"/>
-              <a:t>декартово </a:t>
-            </a:r>
-            <a:r>
               <a:rPr lang="ru-RU" dirty="0"/>
-              <a:t>произведение</a:t>
+              <a:t>декартово произведение</a:t>
             </a:r>
           </a:p>
           <a:p>
             <a:pPr lvl="1"/>
             <a:r>
               <a:rPr lang="ru-RU" dirty="0"/>
-              <a:t> Многомашинные </a:t>
-            </a:r>
-            <a:r>
-              <a:rPr lang="ru-RU" dirty="0" smtClean="0"/>
-              <a:t>сценарии</a:t>
-            </a:r>
-            <a:endParaRPr lang="en-US" dirty="0" smtClean="0"/>
-          </a:p>
-          <a:p>
-            <a:r>
-              <a:rPr lang="en-US" dirty="0" smtClean="0"/>
+              <a:t> Многомашинные сценарии</a:t>
+            </a:r>
+            <a:endParaRPr lang="en-US" dirty="0"/>
+          </a:p>
+          <a:p>
+            <a:r>
+              <a:rPr lang="en-US" dirty="0"/>
               <a:t>s</a:t>
             </a:r>
             <a:r>
-              <a:rPr lang="ru-RU" dirty="0" err="1" smtClean="0"/>
+              <a:rPr lang="ru-RU" dirty="0" err="1"/>
               <a:t>uite</a:t>
             </a:r>
-            <a:endParaRPr lang="en-US" dirty="0" smtClean="0"/>
+            <a:endParaRPr lang="en-US" dirty="0"/>
           </a:p>
           <a:p>
             <a:pPr lvl="1"/>
             <a:r>
               <a:rPr lang="en-US" dirty="0"/>
-              <a:t>scenario </a:t>
-            </a:r>
-            <a:r>
-              <a:rPr lang="en-US" dirty="0" smtClean="0"/>
-              <a:t>group</a:t>
+              <a:t>scenario group</a:t>
             </a:r>
           </a:p>
           <a:p>
             <a:pPr lvl="1"/>
             <a:r>
               <a:rPr lang="ru-RU" dirty="0"/>
-              <a:t>suite </a:t>
-            </a:r>
-            <a:r>
-              <a:rPr lang="ru-RU" dirty="0" smtClean="0"/>
-              <a:t>type</a:t>
-            </a:r>
-            <a:endParaRPr lang="en-US" dirty="0" smtClean="0"/>
+              <a:t>suite type</a:t>
+            </a:r>
+            <a:endParaRPr lang="en-US" dirty="0"/>
           </a:p>
           <a:p>
             <a:r>
               <a:rPr lang="en-US" dirty="0"/>
               <a:t>entity</a:t>
             </a:r>
-            <a:endParaRPr lang="en-US" dirty="0" smtClean="0"/>
-          </a:p>
-          <a:p>
-            <a:r>
-              <a:rPr lang="ru-RU" dirty="0" smtClean="0"/>
+          </a:p>
+          <a:p>
+            <a:r>
+              <a:rPr lang="ru-RU" dirty="0"/>
               <a:t>using</a:t>
             </a:r>
             <a:endParaRPr lang="en-US" dirty="0"/>
@@ -6964,11 +6926,11 @@
           <a:p>
             <a:pPr algn="ctr"/>
             <a:r>
-              <a:rPr lang="ru-RU" sz="5400" b="1" dirty="0" smtClean="0"/>
+              <a:rPr lang="ru-RU" sz="5400" b="1" dirty="0"/>
               <a:t>Вопросы</a:t>
             </a:r>
             <a:r>
-              <a:rPr lang="en-US" sz="5400" b="1" dirty="0" smtClean="0"/>
+              <a:rPr lang="en-US" sz="5400" b="1" dirty="0"/>
               <a:t>?</a:t>
             </a:r>
             <a:endParaRPr lang="ru-RU" sz="5400" b="1" dirty="0"/>
@@ -6998,21 +6960,6 @@
             <a:pPr marL="0" indent="0">
               <a:buNone/>
             </a:pPr>
-            <a:r>
-              <a:rPr lang="ru-RU" dirty="0" smtClean="0"/>
-              <a:t>Документация доступна по адресу:</a:t>
-            </a:r>
-          </a:p>
-          <a:p>
-            <a:pPr marL="0" indent="0">
-              <a:buNone/>
-            </a:pPr>
-            <a:r>
-              <a:rPr lang="en-US" sz="1800" dirty="0">
-                <a:hlinkClick r:id="rId2"/>
-              </a:rPr>
-              <a:t>https://confluence.kaspersky.com/pages/viewpage.action?spaceKey=CTD&amp;title=TDL</a:t>
-            </a:r>
             <a:endParaRPr lang="ru-RU" dirty="0"/>
           </a:p>
         </p:txBody>

</xml_diff>